<commit_message>
Issue 84: Create content outline for feature documentation pages Update Issue 84
</commit_message>
<xml_diff>
--- a/doc/Landing page image - after.pptx
+++ b/doc/Landing page image - after.pptx
@@ -319,7 +319,7 @@
             <a:fld id="{1D8BD707-D9CF-40AE-B4C6-C98DA3205C09}" type="datetimeFigureOut">
               <a:rPr lang="en-US" smtClean="0"/>
               <a:pPr/>
-              <a:t>12/14/2013</a:t>
+              <a:t>12/24/2013</a:t>
             </a:fld>
             <a:endParaRPr lang="en-US"/>
           </a:p>
@@ -486,7 +486,7 @@
             <a:fld id="{1D8BD707-D9CF-40AE-B4C6-C98DA3205C09}" type="datetimeFigureOut">
               <a:rPr lang="en-US" smtClean="0"/>
               <a:pPr/>
-              <a:t>12/14/2013</a:t>
+              <a:t>12/24/2013</a:t>
             </a:fld>
             <a:endParaRPr lang="en-US"/>
           </a:p>
@@ -663,7 +663,7 @@
             <a:fld id="{1D8BD707-D9CF-40AE-B4C6-C98DA3205C09}" type="datetimeFigureOut">
               <a:rPr lang="en-US" smtClean="0"/>
               <a:pPr/>
-              <a:t>12/14/2013</a:t>
+              <a:t>12/24/2013</a:t>
             </a:fld>
             <a:endParaRPr lang="en-US"/>
           </a:p>
@@ -830,7 +830,7 @@
             <a:fld id="{1D8BD707-D9CF-40AE-B4C6-C98DA3205C09}" type="datetimeFigureOut">
               <a:rPr lang="en-US" smtClean="0"/>
               <a:pPr/>
-              <a:t>12/14/2013</a:t>
+              <a:t>12/24/2013</a:t>
             </a:fld>
             <a:endParaRPr lang="en-US"/>
           </a:p>
@@ -1080,7 +1080,7 @@
             <a:fld id="{1D8BD707-D9CF-40AE-B4C6-C98DA3205C09}" type="datetimeFigureOut">
               <a:rPr lang="en-US" smtClean="0"/>
               <a:pPr/>
-              <a:t>12/14/2013</a:t>
+              <a:t>12/24/2013</a:t>
             </a:fld>
             <a:endParaRPr lang="en-US"/>
           </a:p>
@@ -1365,7 +1365,7 @@
             <a:fld id="{1D8BD707-D9CF-40AE-B4C6-C98DA3205C09}" type="datetimeFigureOut">
               <a:rPr lang="en-US" smtClean="0"/>
               <a:pPr/>
-              <a:t>12/14/2013</a:t>
+              <a:t>12/24/2013</a:t>
             </a:fld>
             <a:endParaRPr lang="en-US"/>
           </a:p>
@@ -1784,7 +1784,7 @@
             <a:fld id="{1D8BD707-D9CF-40AE-B4C6-C98DA3205C09}" type="datetimeFigureOut">
               <a:rPr lang="en-US" smtClean="0"/>
               <a:pPr/>
-              <a:t>12/14/2013</a:t>
+              <a:t>12/24/2013</a:t>
             </a:fld>
             <a:endParaRPr lang="en-US"/>
           </a:p>
@@ -1899,7 +1899,7 @@
             <a:fld id="{1D8BD707-D9CF-40AE-B4C6-C98DA3205C09}" type="datetimeFigureOut">
               <a:rPr lang="en-US" smtClean="0"/>
               <a:pPr/>
-              <a:t>12/14/2013</a:t>
+              <a:t>12/24/2013</a:t>
             </a:fld>
             <a:endParaRPr lang="en-US"/>
           </a:p>
@@ -1991,7 +1991,7 @@
             <a:fld id="{1D8BD707-D9CF-40AE-B4C6-C98DA3205C09}" type="datetimeFigureOut">
               <a:rPr lang="en-US" smtClean="0"/>
               <a:pPr/>
-              <a:t>12/14/2013</a:t>
+              <a:t>12/24/2013</a:t>
             </a:fld>
             <a:endParaRPr lang="en-US"/>
           </a:p>
@@ -2265,7 +2265,7 @@
             <a:fld id="{1D8BD707-D9CF-40AE-B4C6-C98DA3205C09}" type="datetimeFigureOut">
               <a:rPr lang="en-US" smtClean="0"/>
               <a:pPr/>
-              <a:t>12/14/2013</a:t>
+              <a:t>12/24/2013</a:t>
             </a:fld>
             <a:endParaRPr lang="en-US"/>
           </a:p>
@@ -2515,7 +2515,7 @@
             <a:fld id="{1D8BD707-D9CF-40AE-B4C6-C98DA3205C09}" type="datetimeFigureOut">
               <a:rPr lang="en-US" smtClean="0"/>
               <a:pPr/>
-              <a:t>12/14/2013</a:t>
+              <a:t>12/24/2013</a:t>
             </a:fld>
             <a:endParaRPr lang="en-US"/>
           </a:p>
@@ -2725,7 +2725,7 @@
             <a:fld id="{1D8BD707-D9CF-40AE-B4C6-C98DA3205C09}" type="datetimeFigureOut">
               <a:rPr lang="en-US" smtClean="0"/>
               <a:pPr/>
-              <a:t>12/14/2013</a:t>
+              <a:t>12/24/2013</a:t>
             </a:fld>
             <a:endParaRPr lang="en-US"/>
           </a:p>
@@ -2827,7 +2827,9 @@
           <a:noFill/>
           <a:ln w="57150">
             <a:solidFill>
-              <a:srgbClr val="0070C0"/>
+              <a:schemeClr val="bg1">
+                <a:lumMod val="85000"/>
+              </a:schemeClr>
             </a:solidFill>
           </a:ln>
         </p:spPr>
@@ -3133,7 +3135,7 @@
 </file>
 
 <file path=ppt/slides/slide1.xml><?xml version="1.0" encoding="utf-8"?>
-<p:sld xmlns:a="http://schemas.openxmlformats.org/drawingml/2006/main" xmlns:r="http://schemas.openxmlformats.org/officeDocument/2006/relationships" xmlns:p="http://schemas.openxmlformats.org/presentationml/2006/main">
+<p:sld xmlns:a="http://schemas.openxmlformats.org/drawingml/2006/main" xmlns:r="http://schemas.openxmlformats.org/officeDocument/2006/relationships" xmlns:p="http://schemas.openxmlformats.org/presentationml/2006/main" show="0">
   <p:cSld>
     <p:spTree>
       <p:nvGrpSpPr>
@@ -4128,13 +4130,13 @@
   <p:clrMapOvr>
     <a:masterClrMapping/>
   </p:clrMapOvr>
-  <mc:AlternateContent xmlns:mc="http://schemas.openxmlformats.org/markup-compatibility/2006">
-    <mc:Choice xmlns:p14="http://schemas.microsoft.com/office/powerpoint/2010/main" Requires="p14">
+  <mc:AlternateContent xmlns:mc="http://schemas.openxmlformats.org/markup-compatibility/2006" xmlns:p14="http://schemas.microsoft.com/office/powerpoint/2010/main">
+    <mc:Choice Requires="p14">
       <p:transition p14:dur="250" advTm="1000">
         <p:fade/>
       </p:transition>
     </mc:Choice>
-    <mc:Fallback>
+    <mc:Fallback xmlns="">
       <p:transition advTm="1000">
         <p:fade/>
       </p:transition>
@@ -4558,13 +4560,13 @@
   <p:clrMapOvr>
     <a:masterClrMapping/>
   </p:clrMapOvr>
-  <mc:AlternateContent xmlns:mc="http://schemas.openxmlformats.org/markup-compatibility/2006">
-    <mc:Choice xmlns:p14="http://schemas.microsoft.com/office/powerpoint/2010/main" Requires="p14">
+  <mc:AlternateContent xmlns:mc="http://schemas.openxmlformats.org/markup-compatibility/2006" xmlns:p14="http://schemas.microsoft.com/office/powerpoint/2010/main">
+    <mc:Choice Requires="p14">
       <p:transition spd="med" p14:dur="700" advTm="0">
         <p:fade/>
       </p:transition>
     </mc:Choice>
-    <mc:Fallback>
+    <mc:Fallback xmlns="">
       <p:transition spd="med" advTm="0">
         <p:fade/>
       </p:transition>
@@ -5018,11 +5020,11 @@
   <p:clrMapOvr>
     <a:masterClrMapping/>
   </p:clrMapOvr>
-  <mc:AlternateContent xmlns:mc="http://schemas.openxmlformats.org/markup-compatibility/2006">
-    <mc:Choice xmlns:p14="http://schemas.microsoft.com/office/powerpoint/2010/main" Requires="p14">
+  <mc:AlternateContent xmlns:mc="http://schemas.openxmlformats.org/markup-compatibility/2006" xmlns:p14="http://schemas.microsoft.com/office/powerpoint/2010/main">
+    <mc:Choice Requires="p14">
       <p:transition p14:dur="0" advClick="0" advTm="0"/>
     </mc:Choice>
-    <mc:Fallback>
+    <mc:Fallback xmlns="">
       <p:transition advClick="0" advTm="0"/>
     </mc:Fallback>
   </mc:AlternateContent>
@@ -5427,11 +5429,11 @@
   <p:clrMapOvr>
     <a:masterClrMapping/>
   </p:clrMapOvr>
-  <mc:AlternateContent xmlns:mc="http://schemas.openxmlformats.org/markup-compatibility/2006">
-    <mc:Choice xmlns:p14="http://schemas.microsoft.com/office/powerpoint/2010/main" Requires="p14">
+  <mc:AlternateContent xmlns:mc="http://schemas.openxmlformats.org/markup-compatibility/2006" xmlns:p14="http://schemas.microsoft.com/office/powerpoint/2010/main">
+    <mc:Choice Requires="p14">
       <p:transition spd="med" p14:dur="700" advTm="0"/>
     </mc:Choice>
-    <mc:Fallback>
+    <mc:Fallback xmlns="">
       <p:transition spd="med" advTm="0"/>
     </mc:Fallback>
   </mc:AlternateContent>
@@ -5702,13 +5704,13 @@
   <p:clrMapOvr>
     <a:masterClrMapping/>
   </p:clrMapOvr>
-  <mc:AlternateContent xmlns:mc="http://schemas.openxmlformats.org/markup-compatibility/2006">
-    <mc:Choice xmlns:p14="http://schemas.microsoft.com/office/powerpoint/2010/main" Requires="p14">
+  <mc:AlternateContent xmlns:mc="http://schemas.openxmlformats.org/markup-compatibility/2006" xmlns:p14="http://schemas.microsoft.com/office/powerpoint/2010/main">
+    <mc:Choice Requires="p14">
       <p:transition spd="med" p14:dur="700" advTm="0">
         <p:fade/>
       </p:transition>
     </mc:Choice>
-    <mc:Fallback>
+    <mc:Fallback xmlns="">
       <p:transition spd="med" advTm="0">
         <p:fade/>
       </p:transition>
@@ -6011,11 +6013,11 @@
   <p:clrMapOvr>
     <a:masterClrMapping/>
   </p:clrMapOvr>
-  <mc:AlternateContent xmlns:mc="http://schemas.openxmlformats.org/markup-compatibility/2006">
-    <mc:Choice xmlns:p14="http://schemas.microsoft.com/office/powerpoint/2010/main" Requires="p14">
+  <mc:AlternateContent xmlns:mc="http://schemas.openxmlformats.org/markup-compatibility/2006" xmlns:p14="http://schemas.microsoft.com/office/powerpoint/2010/main">
+    <mc:Choice Requires="p14">
       <p:transition spd="med" p14:dur="700" advClick="0" advTm="0"/>
     </mc:Choice>
-    <mc:Fallback>
+    <mc:Fallback xmlns="">
       <p:transition spd="med" advClick="0" advTm="0"/>
     </mc:Fallback>
   </mc:AlternateContent>
@@ -6240,11 +6242,11 @@
   <p:clrMapOvr>
     <a:masterClrMapping/>
   </p:clrMapOvr>
-  <mc:AlternateContent xmlns:mc="http://schemas.openxmlformats.org/markup-compatibility/2006">
-    <mc:Choice xmlns:p14="http://schemas.microsoft.com/office/powerpoint/2010/main" Requires="p14">
+  <mc:AlternateContent xmlns:mc="http://schemas.openxmlformats.org/markup-compatibility/2006" xmlns:p14="http://schemas.microsoft.com/office/powerpoint/2010/main">
+    <mc:Choice Requires="p14">
       <p:transition spd="slow" p14:dur="2000" advTm="0"/>
     </mc:Choice>
-    <mc:Fallback>
+    <mc:Fallback xmlns="">
       <p:transition spd="slow" advTm="0"/>
     </mc:Fallback>
   </mc:AlternateContent>
@@ -6593,13 +6595,13 @@
   <p:clrMapOvr>
     <a:masterClrMapping/>
   </p:clrMapOvr>
-  <mc:AlternateContent xmlns:mc="http://schemas.openxmlformats.org/markup-compatibility/2006">
-    <mc:Choice xmlns:p14="http://schemas.microsoft.com/office/powerpoint/2010/main" Requires="p14">
+  <mc:AlternateContent xmlns:mc="http://schemas.openxmlformats.org/markup-compatibility/2006" xmlns:p14="http://schemas.microsoft.com/office/powerpoint/2010/main">
+    <mc:Choice Requires="p14">
       <p:transition p14:dur="250" advTm="0">
         <p:fade/>
       </p:transition>
     </mc:Choice>
-    <mc:Fallback>
+    <mc:Fallback xmlns="">
       <p:transition advTm="0">
         <p:fade/>
       </p:transition>
@@ -7496,13 +7498,13 @@
   <p:clrMapOvr>
     <a:masterClrMapping/>
   </p:clrMapOvr>
-  <mc:AlternateContent xmlns:mc="http://schemas.openxmlformats.org/markup-compatibility/2006">
-    <mc:Choice xmlns:p14="http://schemas.microsoft.com/office/powerpoint/2010/main" Requires="p14">
+  <mc:AlternateContent xmlns:mc="http://schemas.openxmlformats.org/markup-compatibility/2006" xmlns:p14="http://schemas.microsoft.com/office/powerpoint/2010/main">
+    <mc:Choice Requires="p14">
       <p:transition spd="med" p14:dur="700" advTm="0">
         <p:fade/>
       </p:transition>
     </mc:Choice>
-    <mc:Fallback>
+    <mc:Fallback xmlns="">
       <p:transition spd="med" advTm="0">
         <p:fade/>
       </p:transition>
@@ -8111,11 +8113,11 @@
   <p:clrMapOvr>
     <a:masterClrMapping/>
   </p:clrMapOvr>
-  <mc:AlternateContent xmlns:mc="http://schemas.openxmlformats.org/markup-compatibility/2006">
-    <mc:Choice xmlns:p14="http://schemas.microsoft.com/office/powerpoint/2010/main" Requires="p14">
+  <mc:AlternateContent xmlns:mc="http://schemas.openxmlformats.org/markup-compatibility/2006" xmlns:p14="http://schemas.microsoft.com/office/powerpoint/2010/main">
+    <mc:Choice Requires="p14">
       <p:transition spd="slow" p14:dur="2000" advTm="0"/>
     </mc:Choice>
-    <mc:Fallback>
+    <mc:Fallback xmlns="">
       <p:transition spd="slow" advTm="0"/>
     </mc:Fallback>
   </mc:AlternateContent>
@@ -8416,11 +8418,11 @@
   <p:clrMapOvr>
     <a:masterClrMapping/>
   </p:clrMapOvr>
-  <mc:AlternateContent xmlns:mc="http://schemas.openxmlformats.org/markup-compatibility/2006">
-    <mc:Choice xmlns:p14="http://schemas.microsoft.com/office/powerpoint/2010/main" Requires="p14">
+  <mc:AlternateContent xmlns:mc="http://schemas.openxmlformats.org/markup-compatibility/2006" xmlns:p14="http://schemas.microsoft.com/office/powerpoint/2010/main">
+    <mc:Choice Requires="p14">
       <p:transition spd="slow" p14:dur="2000" advClick="0" advTm="0"/>
     </mc:Choice>
-    <mc:Fallback>
+    <mc:Fallback xmlns="">
       <p:transition spd="slow" advClick="0" advTm="0"/>
     </mc:Fallback>
   </mc:AlternateContent>
@@ -8802,11 +8804,11 @@
   <p:clrMapOvr>
     <a:masterClrMapping/>
   </p:clrMapOvr>
-  <mc:AlternateContent xmlns:mc="http://schemas.openxmlformats.org/markup-compatibility/2006">
-    <mc:Choice xmlns:p14="http://schemas.microsoft.com/office/powerpoint/2010/main" Requires="p14">
+  <mc:AlternateContent xmlns:mc="http://schemas.openxmlformats.org/markup-compatibility/2006" xmlns:p14="http://schemas.microsoft.com/office/powerpoint/2010/main">
+    <mc:Choice Requires="p14">
       <p:transition spd="med" p14:dur="700" advTm="0"/>
     </mc:Choice>
-    <mc:Fallback>
+    <mc:Fallback xmlns="">
       <p:transition spd="med" advTm="0"/>
     </mc:Fallback>
   </mc:AlternateContent>
@@ -9527,11 +9529,11 @@
   <p:clrMapOvr>
     <a:masterClrMapping/>
   </p:clrMapOvr>
-  <mc:AlternateContent xmlns:mc="http://schemas.openxmlformats.org/markup-compatibility/2006">
-    <mc:Choice xmlns:p14="http://schemas.microsoft.com/office/powerpoint/2010/main" Requires="p14">
+  <mc:AlternateContent xmlns:mc="http://schemas.openxmlformats.org/markup-compatibility/2006" xmlns:p14="http://schemas.microsoft.com/office/powerpoint/2010/main">
+    <mc:Choice Requires="p14">
       <p:transition spd="med" p14:dur="700" advTm="1000"/>
     </mc:Choice>
-    <mc:Fallback>
+    <mc:Fallback xmlns="">
       <p:transition spd="med" advTm="1000"/>
     </mc:Fallback>
   </mc:AlternateContent>
@@ -10454,11 +10456,11 @@
   <p:clrMapOvr>
     <a:masterClrMapping/>
   </p:clrMapOvr>
-  <mc:AlternateContent xmlns:mc="http://schemas.openxmlformats.org/markup-compatibility/2006">
-    <mc:Choice xmlns:p14="http://schemas.microsoft.com/office/powerpoint/2010/main" Requires="p14">
+  <mc:AlternateContent xmlns:mc="http://schemas.openxmlformats.org/markup-compatibility/2006" xmlns:p14="http://schemas.microsoft.com/office/powerpoint/2010/main">
+    <mc:Choice Requires="p14">
       <p:transition spd="med" p14:dur="700" advClick="0" advTm="0"/>
     </mc:Choice>
-    <mc:Fallback>
+    <mc:Fallback xmlns="">
       <p:transition spd="med" advClick="0" advTm="0"/>
     </mc:Fallback>
   </mc:AlternateContent>
@@ -11294,11 +11296,11 @@
   <p:clrMapOvr>
     <a:masterClrMapping/>
   </p:clrMapOvr>
-  <mc:AlternateContent xmlns:mc="http://schemas.openxmlformats.org/markup-compatibility/2006">
-    <mc:Choice xmlns:p14="http://schemas.microsoft.com/office/powerpoint/2010/main" Requires="p14">
+  <mc:AlternateContent xmlns:mc="http://schemas.openxmlformats.org/markup-compatibility/2006" xmlns:p14="http://schemas.microsoft.com/office/powerpoint/2010/main">
+    <mc:Choice Requires="p14">
       <p:transition spd="med" p14:dur="700" advTm="1000"/>
     </mc:Choice>
-    <mc:Fallback>
+    <mc:Fallback xmlns="">
       <p:transition spd="med" advTm="1000"/>
     </mc:Fallback>
   </mc:AlternateContent>
@@ -12049,11 +12051,11 @@
   <p:clrMapOvr>
     <a:masterClrMapping/>
   </p:clrMapOvr>
-  <mc:AlternateContent xmlns:mc="http://schemas.openxmlformats.org/markup-compatibility/2006">
-    <mc:Choice xmlns:p14="http://schemas.microsoft.com/office/powerpoint/2010/main" Requires="p14">
+  <mc:AlternateContent xmlns:mc="http://schemas.openxmlformats.org/markup-compatibility/2006" xmlns:p14="http://schemas.microsoft.com/office/powerpoint/2010/main">
+    <mc:Choice Requires="p14">
       <p:transition spd="med" p14:dur="700" advClick="0" advTm="0"/>
     </mc:Choice>
-    <mc:Fallback>
+    <mc:Fallback xmlns="">
       <p:transition spd="med" advClick="0" advTm="0"/>
     </mc:Fallback>
   </mc:AlternateContent>
@@ -12889,11 +12891,11 @@
   <p:clrMapOvr>
     <a:masterClrMapping/>
   </p:clrMapOvr>
-  <mc:AlternateContent xmlns:mc="http://schemas.openxmlformats.org/markup-compatibility/2006">
-    <mc:Choice xmlns:p14="http://schemas.microsoft.com/office/powerpoint/2010/main" Requires="p14">
+  <mc:AlternateContent xmlns:mc="http://schemas.openxmlformats.org/markup-compatibility/2006" xmlns:p14="http://schemas.microsoft.com/office/powerpoint/2010/main">
+    <mc:Choice Requires="p14">
       <p:transition spd="med" p14:dur="700" advTm="1000"/>
     </mc:Choice>
-    <mc:Fallback>
+    <mc:Fallback xmlns="">
       <p:transition spd="med" advTm="1000"/>
     </mc:Fallback>
   </mc:AlternateContent>
@@ -13644,11 +13646,11 @@
   <p:clrMapOvr>
     <a:masterClrMapping/>
   </p:clrMapOvr>
-  <mc:AlternateContent xmlns:mc="http://schemas.openxmlformats.org/markup-compatibility/2006">
-    <mc:Choice xmlns:p14="http://schemas.microsoft.com/office/powerpoint/2010/main" Requires="p14">
+  <mc:AlternateContent xmlns:mc="http://schemas.openxmlformats.org/markup-compatibility/2006" xmlns:p14="http://schemas.microsoft.com/office/powerpoint/2010/main">
+    <mc:Choice Requires="p14">
       <p:transition spd="med" p14:dur="700" advClick="0" advTm="0"/>
     </mc:Choice>
-    <mc:Fallback>
+    <mc:Fallback xmlns="">
       <p:transition spd="med" advClick="0" advTm="0"/>
     </mc:Fallback>
   </mc:AlternateContent>
@@ -13992,11 +13994,11 @@
   <p:clrMapOvr>
     <a:masterClrMapping/>
   </p:clrMapOvr>
-  <mc:AlternateContent xmlns:mc="http://schemas.openxmlformats.org/markup-compatibility/2006">
-    <mc:Choice xmlns:p14="http://schemas.microsoft.com/office/powerpoint/2010/main" Requires="p14">
+  <mc:AlternateContent xmlns:mc="http://schemas.openxmlformats.org/markup-compatibility/2006" xmlns:p14="http://schemas.microsoft.com/office/powerpoint/2010/main">
+    <mc:Choice Requires="p14">
       <p:transition spd="slow" p14:dur="2000" advClick="0" advTm="0"/>
     </mc:Choice>
-    <mc:Fallback>
+    <mc:Fallback xmlns="">
       <p:transition spd="slow" advClick="0" advTm="0"/>
     </mc:Fallback>
   </mc:AlternateContent>
@@ -14856,11 +14858,11 @@
   <p:clrMapOvr>
     <a:masterClrMapping/>
   </p:clrMapOvr>
-  <mc:AlternateContent xmlns:mc="http://schemas.openxmlformats.org/markup-compatibility/2006">
-    <mc:Choice xmlns:p14="http://schemas.microsoft.com/office/powerpoint/2010/main" Requires="p14">
+  <mc:AlternateContent xmlns:mc="http://schemas.openxmlformats.org/markup-compatibility/2006" xmlns:p14="http://schemas.microsoft.com/office/powerpoint/2010/main">
+    <mc:Choice Requires="p14">
       <p:transition spd="med" p14:dur="700" advTm="1000"/>
     </mc:Choice>
-    <mc:Fallback>
+    <mc:Fallback xmlns="">
       <p:transition spd="med" advTm="1000"/>
     </mc:Fallback>
   </mc:AlternateContent>
@@ -14949,11 +14951,11 @@
   <p:clrMapOvr>
     <a:masterClrMapping/>
   </p:clrMapOvr>
-  <mc:AlternateContent xmlns:mc="http://schemas.openxmlformats.org/markup-compatibility/2006">
-    <mc:Choice xmlns:p14="http://schemas.microsoft.com/office/powerpoint/2010/main" Requires="p14">
+  <mc:AlternateContent xmlns:mc="http://schemas.openxmlformats.org/markup-compatibility/2006" xmlns:p14="http://schemas.microsoft.com/office/powerpoint/2010/main">
+    <mc:Choice Requires="p14">
       <p:transition spd="slow" p14:dur="2000" advTm="0"/>
     </mc:Choice>
-    <mc:Fallback>
+    <mc:Fallback xmlns="">
       <p:transition spd="slow" advTm="0"/>
     </mc:Fallback>
   </mc:AlternateContent>
@@ -15148,11 +15150,11 @@
   <p:clrMapOvr>
     <a:masterClrMapping/>
   </p:clrMapOvr>
-  <mc:AlternateContent xmlns:mc="http://schemas.openxmlformats.org/markup-compatibility/2006">
-    <mc:Choice xmlns:p14="http://schemas.microsoft.com/office/powerpoint/2010/main" Requires="p14">
+  <mc:AlternateContent xmlns:mc="http://schemas.openxmlformats.org/markup-compatibility/2006" xmlns:p14="http://schemas.microsoft.com/office/powerpoint/2010/main">
+    <mc:Choice Requires="p14">
       <p:transition spd="slow" p14:dur="2000" advTm="0"/>
     </mc:Choice>
-    <mc:Fallback>
+    <mc:Fallback xmlns="">
       <p:transition spd="slow" advTm="0"/>
     </mc:Fallback>
   </mc:AlternateContent>
@@ -15584,11 +15586,11 @@
   <p:clrMapOvr>
     <a:masterClrMapping/>
   </p:clrMapOvr>
-  <mc:AlternateContent xmlns:mc="http://schemas.openxmlformats.org/markup-compatibility/2006">
-    <mc:Choice xmlns:p14="http://schemas.microsoft.com/office/powerpoint/2010/main" Requires="p14">
+  <mc:AlternateContent xmlns:mc="http://schemas.openxmlformats.org/markup-compatibility/2006" xmlns:p14="http://schemas.microsoft.com/office/powerpoint/2010/main">
+    <mc:Choice Requires="p14">
       <p:transition spd="slow" p14:dur="2000" advClick="0" advTm="0"/>
     </mc:Choice>
-    <mc:Fallback>
+    <mc:Fallback xmlns="">
       <p:transition spd="slow" advClick="0" advTm="0"/>
     </mc:Fallback>
   </mc:AlternateContent>
@@ -16385,13 +16387,13 @@
   <p:clrMapOvr>
     <a:masterClrMapping/>
   </p:clrMapOvr>
-  <mc:AlternateContent xmlns:mc="http://schemas.openxmlformats.org/markup-compatibility/2006">
-    <mc:Choice xmlns:p14="http://schemas.microsoft.com/office/powerpoint/2010/main" Requires="p14">
+  <mc:AlternateContent xmlns:mc="http://schemas.openxmlformats.org/markup-compatibility/2006" xmlns:p14="http://schemas.microsoft.com/office/powerpoint/2010/main">
+    <mc:Choice Requires="p14">
       <p:transition spd="med" p14:dur="700" advTm="0">
         <p:fade/>
       </p:transition>
     </mc:Choice>
-    <mc:Fallback>
+    <mc:Fallback xmlns="">
       <p:transition spd="med" advTm="0">
         <p:fade/>
       </p:transition>
@@ -17486,13 +17488,13 @@
   <p:clrMapOvr>
     <a:masterClrMapping/>
   </p:clrMapOvr>
-  <mc:AlternateContent xmlns:mc="http://schemas.openxmlformats.org/markup-compatibility/2006">
-    <mc:Choice xmlns:p14="http://schemas.microsoft.com/office/powerpoint/2010/main" Requires="p14">
+  <mc:AlternateContent xmlns:mc="http://schemas.openxmlformats.org/markup-compatibility/2006" xmlns:p14="http://schemas.microsoft.com/office/powerpoint/2010/main">
+    <mc:Choice Requires="p14">
       <p:transition p14:dur="250" advTm="1000">
         <p:fade/>
       </p:transition>
     </mc:Choice>
-    <mc:Fallback>
+    <mc:Fallback xmlns="">
       <p:transition advTm="1000">
         <p:fade/>
       </p:transition>
@@ -18273,13 +18275,13 @@
   <p:clrMapOvr>
     <a:masterClrMapping/>
   </p:clrMapOvr>
-  <mc:AlternateContent xmlns:mc="http://schemas.openxmlformats.org/markup-compatibility/2006">
-    <mc:Choice xmlns:p14="http://schemas.microsoft.com/office/powerpoint/2010/main" Requires="p14">
+  <mc:AlternateContent xmlns:mc="http://schemas.openxmlformats.org/markup-compatibility/2006" xmlns:p14="http://schemas.microsoft.com/office/powerpoint/2010/main">
+    <mc:Choice Requires="p14">
       <p:transition p14:dur="250" advTm="1000">
         <p:fade/>
       </p:transition>
     </mc:Choice>
-    <mc:Fallback>
+    <mc:Fallback xmlns="">
       <p:transition advTm="1000">
         <p:fade/>
       </p:transition>
@@ -19279,13 +19281,13 @@
   <p:clrMapOvr>
     <a:masterClrMapping/>
   </p:clrMapOvr>
-  <mc:AlternateContent xmlns:mc="http://schemas.openxmlformats.org/markup-compatibility/2006">
-    <mc:Choice xmlns:p14="http://schemas.microsoft.com/office/powerpoint/2010/main" Requires="p14">
+  <mc:AlternateContent xmlns:mc="http://schemas.openxmlformats.org/markup-compatibility/2006" xmlns:p14="http://schemas.microsoft.com/office/powerpoint/2010/main">
+    <mc:Choice Requires="p14">
       <p:transition p14:dur="250" advTm="1000">
         <p:fade/>
       </p:transition>
     </mc:Choice>
-    <mc:Fallback>
+    <mc:Fallback xmlns="">
       <p:transition advTm="1000">
         <p:fade/>
       </p:transition>

</xml_diff>

<commit_message>
Issue 85b: Change gif background from orange to white Udate Issue 85
</commit_message>
<xml_diff>
--- a/doc/Landing page image - after.pptx
+++ b/doc/Landing page image - after.pptx
@@ -319,7 +319,7 @@
             <a:fld id="{1D8BD707-D9CF-40AE-B4C6-C98DA3205C09}" type="datetimeFigureOut">
               <a:rPr lang="en-US" smtClean="0"/>
               <a:pPr/>
-              <a:t>12/24/2013</a:t>
+              <a:t>12/25/2013</a:t>
             </a:fld>
             <a:endParaRPr lang="en-US"/>
           </a:p>
@@ -486,7 +486,7 @@
             <a:fld id="{1D8BD707-D9CF-40AE-B4C6-C98DA3205C09}" type="datetimeFigureOut">
               <a:rPr lang="en-US" smtClean="0"/>
               <a:pPr/>
-              <a:t>12/24/2013</a:t>
+              <a:t>12/25/2013</a:t>
             </a:fld>
             <a:endParaRPr lang="en-US"/>
           </a:p>
@@ -663,7 +663,7 @@
             <a:fld id="{1D8BD707-D9CF-40AE-B4C6-C98DA3205C09}" type="datetimeFigureOut">
               <a:rPr lang="en-US" smtClean="0"/>
               <a:pPr/>
-              <a:t>12/24/2013</a:t>
+              <a:t>12/25/2013</a:t>
             </a:fld>
             <a:endParaRPr lang="en-US"/>
           </a:p>
@@ -830,7 +830,7 @@
             <a:fld id="{1D8BD707-D9CF-40AE-B4C6-C98DA3205C09}" type="datetimeFigureOut">
               <a:rPr lang="en-US" smtClean="0"/>
               <a:pPr/>
-              <a:t>12/24/2013</a:t>
+              <a:t>12/25/2013</a:t>
             </a:fld>
             <a:endParaRPr lang="en-US"/>
           </a:p>
@@ -1080,7 +1080,7 @@
             <a:fld id="{1D8BD707-D9CF-40AE-B4C6-C98DA3205C09}" type="datetimeFigureOut">
               <a:rPr lang="en-US" smtClean="0"/>
               <a:pPr/>
-              <a:t>12/24/2013</a:t>
+              <a:t>12/25/2013</a:t>
             </a:fld>
             <a:endParaRPr lang="en-US"/>
           </a:p>
@@ -1365,7 +1365,7 @@
             <a:fld id="{1D8BD707-D9CF-40AE-B4C6-C98DA3205C09}" type="datetimeFigureOut">
               <a:rPr lang="en-US" smtClean="0"/>
               <a:pPr/>
-              <a:t>12/24/2013</a:t>
+              <a:t>12/25/2013</a:t>
             </a:fld>
             <a:endParaRPr lang="en-US"/>
           </a:p>
@@ -1784,7 +1784,7 @@
             <a:fld id="{1D8BD707-D9CF-40AE-B4C6-C98DA3205C09}" type="datetimeFigureOut">
               <a:rPr lang="en-US" smtClean="0"/>
               <a:pPr/>
-              <a:t>12/24/2013</a:t>
+              <a:t>12/25/2013</a:t>
             </a:fld>
             <a:endParaRPr lang="en-US"/>
           </a:p>
@@ -1899,7 +1899,7 @@
             <a:fld id="{1D8BD707-D9CF-40AE-B4C6-C98DA3205C09}" type="datetimeFigureOut">
               <a:rPr lang="en-US" smtClean="0"/>
               <a:pPr/>
-              <a:t>12/24/2013</a:t>
+              <a:t>12/25/2013</a:t>
             </a:fld>
             <a:endParaRPr lang="en-US"/>
           </a:p>
@@ -1991,7 +1991,7 @@
             <a:fld id="{1D8BD707-D9CF-40AE-B4C6-C98DA3205C09}" type="datetimeFigureOut">
               <a:rPr lang="en-US" smtClean="0"/>
               <a:pPr/>
-              <a:t>12/24/2013</a:t>
+              <a:t>12/25/2013</a:t>
             </a:fld>
             <a:endParaRPr lang="en-US"/>
           </a:p>
@@ -2265,7 +2265,7 @@
             <a:fld id="{1D8BD707-D9CF-40AE-B4C6-C98DA3205C09}" type="datetimeFigureOut">
               <a:rPr lang="en-US" smtClean="0"/>
               <a:pPr/>
-              <a:t>12/24/2013</a:t>
+              <a:t>12/25/2013</a:t>
             </a:fld>
             <a:endParaRPr lang="en-US"/>
           </a:p>
@@ -2515,7 +2515,7 @@
             <a:fld id="{1D8BD707-D9CF-40AE-B4C6-C98DA3205C09}" type="datetimeFigureOut">
               <a:rPr lang="en-US" smtClean="0"/>
               <a:pPr/>
-              <a:t>12/24/2013</a:t>
+              <a:t>12/25/2013</a:t>
             </a:fld>
             <a:endParaRPr lang="en-US"/>
           </a:p>
@@ -2725,7 +2725,7 @@
             <a:fld id="{1D8BD707-D9CF-40AE-B4C6-C98DA3205C09}" type="datetimeFigureOut">
               <a:rPr lang="en-US" smtClean="0"/>
               <a:pPr/>
-              <a:t>12/24/2013</a:t>
+              <a:t>12/25/2013</a:t>
             </a:fld>
             <a:endParaRPr lang="en-US"/>
           </a:p>
@@ -3246,11 +3246,11 @@
   <p:clrMapOvr>
     <a:masterClrMapping/>
   </p:clrMapOvr>
-  <mc:AlternateContent xmlns:mc="http://schemas.openxmlformats.org/markup-compatibility/2006">
-    <mc:Choice xmlns:p14="http://schemas.microsoft.com/office/powerpoint/2010/main" Requires="p14">
+  <mc:AlternateContent xmlns:mc="http://schemas.openxmlformats.org/markup-compatibility/2006" xmlns:p14="http://schemas.microsoft.com/office/powerpoint/2010/main">
+    <mc:Choice Requires="p14">
       <p:transition spd="slow" p14:dur="2000" advTm="2000"/>
     </mc:Choice>
-    <mc:Fallback>
+    <mc:Fallback xmlns="">
       <p:transition spd="slow" advTm="2000"/>
     </mc:Fallback>
   </mc:AlternateContent>
@@ -7498,16 +7498,12 @@
   <p:clrMapOvr>
     <a:masterClrMapping/>
   </p:clrMapOvr>
-  <mc:AlternateContent xmlns:mc="http://schemas.openxmlformats.org/markup-compatibility/2006" xmlns:p14="http://schemas.microsoft.com/office/powerpoint/2010/main">
-    <mc:Choice Requires="p14">
-      <p:transition spd="med" p14:dur="700" advTm="0">
-        <p:fade/>
-      </p:transition>
+  <mc:AlternateContent xmlns:mc="http://schemas.openxmlformats.org/markup-compatibility/2006">
+    <mc:Choice xmlns:p14="http://schemas.microsoft.com/office/powerpoint/2010/main" Requires="p14">
+      <p:transition p14:dur="0" advTm="0"/>
     </mc:Choice>
-    <mc:Fallback xmlns="">
-      <p:transition spd="med" advTm="0">
-        <p:fade/>
-      </p:transition>
+    <mc:Fallback>
+      <p:transition advTm="0"/>
     </mc:Fallback>
   </mc:AlternateContent>
   <p:timing>

</xml_diff>